<commit_message>
First attempt to construct Android app (prefs and splashscreen)
</commit_message>
<xml_diff>
--- a/Documents/Screenwires/Interaction.pptx
+++ b/Documents/Screenwires/Interaction.pptx
@@ -8,7 +8,7 @@
     <p:sldId id="256" r:id="rId2"/>
   </p:sldIdLst>
   <p:sldSz cx="9144000" cy="6858000" type="screen4x3"/>
-  <p:notesSz cx="6858000" cy="9144000"/>
+  <p:notesSz cx="6797675" cy="9874250"/>
   <p:defaultTextStyle>
     <a:defPPr>
       <a:defRPr lang="nl-NL"/>
@@ -289,7 +289,7 @@
             <a:fld id="{8638F0FA-503B-447F-A02E-6BF1D880434F}" type="datetimeFigureOut">
               <a:rPr lang="nl-NL" smtClean="0"/>
               <a:pPr/>
-              <a:t>19-5-2011</a:t>
+              <a:t>23-5-2011</a:t>
             </a:fld>
             <a:endParaRPr lang="nl-NL"/>
           </a:p>
@@ -456,7 +456,7 @@
             <a:fld id="{8638F0FA-503B-447F-A02E-6BF1D880434F}" type="datetimeFigureOut">
               <a:rPr lang="nl-NL" smtClean="0"/>
               <a:pPr/>
-              <a:t>19-5-2011</a:t>
+              <a:t>23-5-2011</a:t>
             </a:fld>
             <a:endParaRPr lang="nl-NL"/>
           </a:p>
@@ -633,7 +633,7 @@
             <a:fld id="{8638F0FA-503B-447F-A02E-6BF1D880434F}" type="datetimeFigureOut">
               <a:rPr lang="nl-NL" smtClean="0"/>
               <a:pPr/>
-              <a:t>19-5-2011</a:t>
+              <a:t>23-5-2011</a:t>
             </a:fld>
             <a:endParaRPr lang="nl-NL"/>
           </a:p>
@@ -800,7 +800,7 @@
             <a:fld id="{8638F0FA-503B-447F-A02E-6BF1D880434F}" type="datetimeFigureOut">
               <a:rPr lang="nl-NL" smtClean="0"/>
               <a:pPr/>
-              <a:t>19-5-2011</a:t>
+              <a:t>23-5-2011</a:t>
             </a:fld>
             <a:endParaRPr lang="nl-NL"/>
           </a:p>
@@ -1043,7 +1043,7 @@
             <a:fld id="{8638F0FA-503B-447F-A02E-6BF1D880434F}" type="datetimeFigureOut">
               <a:rPr lang="nl-NL" smtClean="0"/>
               <a:pPr/>
-              <a:t>19-5-2011</a:t>
+              <a:t>23-5-2011</a:t>
             </a:fld>
             <a:endParaRPr lang="nl-NL"/>
           </a:p>
@@ -1328,7 +1328,7 @@
             <a:fld id="{8638F0FA-503B-447F-A02E-6BF1D880434F}" type="datetimeFigureOut">
               <a:rPr lang="nl-NL" smtClean="0"/>
               <a:pPr/>
-              <a:t>19-5-2011</a:t>
+              <a:t>23-5-2011</a:t>
             </a:fld>
             <a:endParaRPr lang="nl-NL"/>
           </a:p>
@@ -1747,7 +1747,7 @@
             <a:fld id="{8638F0FA-503B-447F-A02E-6BF1D880434F}" type="datetimeFigureOut">
               <a:rPr lang="nl-NL" smtClean="0"/>
               <a:pPr/>
-              <a:t>19-5-2011</a:t>
+              <a:t>23-5-2011</a:t>
             </a:fld>
             <a:endParaRPr lang="nl-NL"/>
           </a:p>
@@ -1862,7 +1862,7 @@
             <a:fld id="{8638F0FA-503B-447F-A02E-6BF1D880434F}" type="datetimeFigureOut">
               <a:rPr lang="nl-NL" smtClean="0"/>
               <a:pPr/>
-              <a:t>19-5-2011</a:t>
+              <a:t>23-5-2011</a:t>
             </a:fld>
             <a:endParaRPr lang="nl-NL"/>
           </a:p>
@@ -1954,7 +1954,7 @@
             <a:fld id="{8638F0FA-503B-447F-A02E-6BF1D880434F}" type="datetimeFigureOut">
               <a:rPr lang="nl-NL" smtClean="0"/>
               <a:pPr/>
-              <a:t>19-5-2011</a:t>
+              <a:t>23-5-2011</a:t>
             </a:fld>
             <a:endParaRPr lang="nl-NL"/>
           </a:p>
@@ -2228,7 +2228,7 @@
             <a:fld id="{8638F0FA-503B-447F-A02E-6BF1D880434F}" type="datetimeFigureOut">
               <a:rPr lang="nl-NL" smtClean="0"/>
               <a:pPr/>
-              <a:t>19-5-2011</a:t>
+              <a:t>23-5-2011</a:t>
             </a:fld>
             <a:endParaRPr lang="nl-NL"/>
           </a:p>
@@ -2478,7 +2478,7 @@
             <a:fld id="{8638F0FA-503B-447F-A02E-6BF1D880434F}" type="datetimeFigureOut">
               <a:rPr lang="nl-NL" smtClean="0"/>
               <a:pPr/>
-              <a:t>19-5-2011</a:t>
+              <a:t>23-5-2011</a:t>
             </a:fld>
             <a:endParaRPr lang="nl-NL"/>
           </a:p>
@@ -2688,7 +2688,7 @@
             <a:fld id="{8638F0FA-503B-447F-A02E-6BF1D880434F}" type="datetimeFigureOut">
               <a:rPr lang="nl-NL" smtClean="0"/>
               <a:pPr/>
-              <a:t>19-5-2011</a:t>
+              <a:t>23-5-2011</a:t>
             </a:fld>
             <a:endParaRPr lang="nl-NL"/>
           </a:p>
@@ -3513,11 +3513,7 @@
             </a:r>
             <a:r>
               <a:rPr lang="nl-NL" sz="1100" dirty="0" smtClean="0"/>
-              <a:t> </a:t>
-            </a:r>
-            <a:r>
-              <a:rPr lang="nl-NL" sz="1100" dirty="0" smtClean="0"/>
-              <a:t>(auto scroll). Select </a:t>
+              <a:t> (auto scroll). Select </a:t>
             </a:r>
             <a:r>
               <a:rPr lang="nl-NL" sz="1100" dirty="0" err="1" smtClean="0"/>
@@ -3706,7 +3702,6 @@
               <a:rPr lang="nl-NL" sz="1100" dirty="0" smtClean="0"/>
               <a:t>.</a:t>
             </a:r>
-            <a:endParaRPr lang="nl-NL" sz="1100" dirty="0" smtClean="0"/>
           </a:p>
         </p:txBody>
       </p:sp>

</xml_diff>